<commit_message>
add presentation | text :: conference
</commit_message>
<xml_diff>
--- a/03. conference (17.04.21)/conference.pptx
+++ b/03. conference (17.04.21)/conference.pptx
@@ -225,7 +225,7 @@
           <a:p>
             <a:fld id="{FC7F5CCD-3BEF-406D-A712-8D5DC93D3A86}" type="datetimeFigureOut">
               <a:rPr lang="ru-RU" smtClean="0"/>
-              <a:t>15.04.2021</a:t>
+              <a:t>16.04.2021</a:t>
             </a:fld>
             <a:endParaRPr lang="ru-RU"/>
           </a:p>
@@ -402,7 +402,7 @@
           <a:p>
             <a:fld id="{DC4850EC-5632-41A4-87BD-89EED6E6341F}" type="datetimeFigureOut">
               <a:rPr lang="ru-RU" smtClean="0"/>
-              <a:t>15.04.2021</a:t>
+              <a:t>16.04.2021</a:t>
             </a:fld>
             <a:endParaRPr lang="ru-RU"/>
           </a:p>
@@ -816,7 +816,7 @@
           <a:p>
             <a:fld id="{8F730C9A-C20E-4369-857A-018C4B8B7AFF}" type="datetime1">
               <a:rPr lang="ru-RU" smtClean="0"/>
-              <a:t>15.04.2021</a:t>
+              <a:t>16.04.2021</a:t>
             </a:fld>
             <a:endParaRPr lang="ru-RU"/>
           </a:p>
@@ -1014,7 +1014,7 @@
           <a:p>
             <a:fld id="{ED8CF0CE-8BFD-4752-B99E-8957F9B94981}" type="datetime1">
               <a:rPr lang="ru-RU" smtClean="0"/>
-              <a:t>15.04.2021</a:t>
+              <a:t>16.04.2021</a:t>
             </a:fld>
             <a:endParaRPr lang="ru-RU"/>
           </a:p>
@@ -1222,7 +1222,7 @@
           <a:p>
             <a:fld id="{2CFDC63F-9BAD-46B4-8ABC-003597D4CFCC}" type="datetime1">
               <a:rPr lang="ru-RU" smtClean="0"/>
-              <a:t>15.04.2021</a:t>
+              <a:t>16.04.2021</a:t>
             </a:fld>
             <a:endParaRPr lang="ru-RU"/>
           </a:p>
@@ -1420,7 +1420,7 @@
           <a:p>
             <a:fld id="{2D245652-C013-4F6B-8932-CAB7890F1D29}" type="datetime1">
               <a:rPr lang="ru-RU" smtClean="0"/>
-              <a:t>15.04.2021</a:t>
+              <a:t>16.04.2021</a:t>
             </a:fld>
             <a:endParaRPr lang="ru-RU"/>
           </a:p>
@@ -1695,7 +1695,7 @@
           <a:p>
             <a:fld id="{5581E414-7924-4975-9E8C-744F2DC59D39}" type="datetime1">
               <a:rPr lang="ru-RU" smtClean="0"/>
-              <a:t>15.04.2021</a:t>
+              <a:t>16.04.2021</a:t>
             </a:fld>
             <a:endParaRPr lang="ru-RU"/>
           </a:p>
@@ -1960,7 +1960,7 @@
           <a:p>
             <a:fld id="{8BCC98CB-B772-469E-A4F8-38A61972A38E}" type="datetime1">
               <a:rPr lang="ru-RU" smtClean="0"/>
-              <a:t>15.04.2021</a:t>
+              <a:t>16.04.2021</a:t>
             </a:fld>
             <a:endParaRPr lang="ru-RU"/>
           </a:p>
@@ -2372,7 +2372,7 @@
           <a:p>
             <a:fld id="{EFFF2F51-4D5C-4175-BAD5-56BCB41D3ED4}" type="datetime1">
               <a:rPr lang="ru-RU" smtClean="0"/>
-              <a:t>15.04.2021</a:t>
+              <a:t>16.04.2021</a:t>
             </a:fld>
             <a:endParaRPr lang="ru-RU"/>
           </a:p>
@@ -2513,7 +2513,7 @@
           <a:p>
             <a:fld id="{92BD0C6C-D72C-4198-B53B-4CBF90968606}" type="datetime1">
               <a:rPr lang="ru-RU" smtClean="0"/>
-              <a:t>15.04.2021</a:t>
+              <a:t>16.04.2021</a:t>
             </a:fld>
             <a:endParaRPr lang="ru-RU"/>
           </a:p>
@@ -2626,7 +2626,7 @@
           <a:p>
             <a:fld id="{06A22CA4-ED26-4C30-B455-97CA65DC4A52}" type="datetime1">
               <a:rPr lang="ru-RU" smtClean="0"/>
-              <a:t>15.04.2021</a:t>
+              <a:t>16.04.2021</a:t>
             </a:fld>
             <a:endParaRPr lang="ru-RU"/>
           </a:p>
@@ -2937,7 +2937,7 @@
           <a:p>
             <a:fld id="{A90B8D78-5084-4AAC-8C44-2D34E204854D}" type="datetime1">
               <a:rPr lang="ru-RU" smtClean="0"/>
-              <a:t>15.04.2021</a:t>
+              <a:t>16.04.2021</a:t>
             </a:fld>
             <a:endParaRPr lang="ru-RU"/>
           </a:p>
@@ -3225,7 +3225,7 @@
           <a:p>
             <a:fld id="{9696CE41-D6CD-4D8B-9733-9B4AD2B1B738}" type="datetime1">
               <a:rPr lang="ru-RU" smtClean="0"/>
-              <a:t>15.04.2021</a:t>
+              <a:t>16.04.2021</a:t>
             </a:fld>
             <a:endParaRPr lang="ru-RU"/>
           </a:p>
@@ -3466,7 +3466,7 @@
           <a:p>
             <a:fld id="{0DA99D6D-C505-481C-BC7A-3B827B64128C}" type="datetime1">
               <a:rPr lang="ru-RU" smtClean="0"/>
-              <a:t>15.04.2021</a:t>
+              <a:t>16.04.2021</a:t>
             </a:fld>
             <a:endParaRPr lang="ru-RU"/>
           </a:p>
@@ -4754,6 +4754,71 @@
           </a:p>
         </p:txBody>
       </p:sp>
+      <p:sp>
+        <p:nvSpPr>
+          <p:cNvPr id="7" name="Заголовок 1">
+            <a:extLst>
+              <a:ext uri="{FF2B5EF4-FFF2-40B4-BE49-F238E27FC236}">
+                <a16:creationId xmlns:a16="http://schemas.microsoft.com/office/drawing/2014/main" id="{8B3736D9-7BDA-46B1-B0C1-4D726AF9DA1D}"/>
+              </a:ext>
+            </a:extLst>
+          </p:cNvPr>
+          <p:cNvSpPr txBox="1">
+            <a:spLocks/>
+          </p:cNvSpPr>
+          <p:nvPr/>
+        </p:nvSpPr>
+        <p:spPr>
+          <a:xfrm>
+            <a:off x="6013570" y="3878263"/>
+            <a:ext cx="9144000" cy="2387600"/>
+          </a:xfrm>
+          <a:prstGeom prst="rect">
+            <a:avLst/>
+          </a:prstGeom>
+        </p:spPr>
+        <p:txBody>
+          <a:bodyPr vert="horz" lIns="91440" tIns="45720" rIns="91440" bIns="45720" rtlCol="0" anchor="b">
+            <a:normAutofit/>
+          </a:bodyPr>
+          <a:lstStyle>
+            <a:lvl1pPr algn="ctr" defTabSz="914400" rtl="0" eaLnBrk="1" latinLnBrk="0" hangingPunct="1">
+              <a:lnSpc>
+                <a:spcPct val="90000"/>
+              </a:lnSpc>
+              <a:spcBef>
+                <a:spcPct val="0"/>
+              </a:spcBef>
+              <a:buNone/>
+              <a:defRPr sz="6000" kern="1200">
+                <a:solidFill>
+                  <a:schemeClr val="tx1"/>
+                </a:solidFill>
+                <a:latin typeface="+mj-lt"/>
+                <a:ea typeface="+mj-ea"/>
+                <a:cs typeface="+mj-cs"/>
+              </a:defRPr>
+            </a:lvl1pPr>
+          </a:lstStyle>
+          <a:p>
+            <a:r>
+              <a:rPr lang="en-US" sz="2000" dirty="0">
+                <a:solidFill>
+                  <a:srgbClr val="002060"/>
+                </a:solidFill>
+                <a:latin typeface="Consolas" panose="020B0609020204030204" pitchFamily="49" charset="0"/>
+              </a:rPr>
+              <a:t>github.com/aptmess</a:t>
+            </a:r>
+            <a:endParaRPr lang="ru-RU" sz="2000" dirty="0">
+              <a:solidFill>
+                <a:srgbClr val="002060"/>
+              </a:solidFill>
+              <a:latin typeface="Consolas" panose="020B0609020204030204" pitchFamily="49" charset="0"/>
+            </a:endParaRPr>
+          </a:p>
+        </p:txBody>
+      </p:sp>
     </p:spTree>
     <p:extLst>
       <p:ext uri="{BB962C8B-B14F-4D97-AF65-F5344CB8AC3E}">
@@ -6361,7 +6426,7 @@
         <p:spPr>
           <a:xfrm>
             <a:off x="952500" y="1508005"/>
-            <a:ext cx="10603527" cy="5016758"/>
+            <a:ext cx="10603527" cy="4708981"/>
           </a:xfrm>
           <a:prstGeom prst="rect">
             <a:avLst/>
@@ -6449,7 +6514,7 @@
                 <a:latin typeface="Consolas" panose="020B0609020204030204" pitchFamily="49" charset="0"/>
                 <a:cs typeface="Segoe UI" panose="020B0502040204020203" pitchFamily="34" charset="0"/>
               </a:rPr>
-              <a:t>новая величина русской по эти чес кой реальности</a:t>
+              <a:t>новая величина русской поэтической реальности</a:t>
             </a:r>
             <a:endParaRPr lang="en-US" sz="2000" dirty="0">
               <a:solidFill>
@@ -6547,55 +6612,7 @@
                 <a:latin typeface="Consolas" panose="020B0609020204030204" pitchFamily="49" charset="0"/>
                 <a:cs typeface="Segoe UI" panose="020B0502040204020203" pitchFamily="34" charset="0"/>
               </a:rPr>
-              <a:t>нов</a:t>
-            </a:r>
-            <a:r>
-              <a:rPr lang="en-US" sz="2000" dirty="0">
-                <a:solidFill>
-                  <a:schemeClr val="accent6">
-                    <a:lumMod val="75000"/>
-                  </a:schemeClr>
-                </a:solidFill>
-                <a:latin typeface="Consolas" panose="020B0609020204030204" pitchFamily="49" charset="0"/>
-                <a:cs typeface="Segoe UI" panose="020B0502040204020203" pitchFamily="34" charset="0"/>
-              </a:rPr>
-              <a:t> </a:t>
-            </a:r>
-            <a:r>
-              <a:rPr lang="ru-RU" sz="2000" dirty="0">
-                <a:solidFill>
-                  <a:schemeClr val="accent6">
-                    <a:lumMod val="75000"/>
-                  </a:schemeClr>
-                </a:solidFill>
-                <a:latin typeface="Consolas" panose="020B0609020204030204" pitchFamily="49" charset="0"/>
-                <a:cs typeface="Segoe UI" panose="020B0502040204020203" pitchFamily="34" charset="0"/>
-              </a:rPr>
-              <a:t>а</a:t>
-            </a:r>
-            <a:r>
-              <a:rPr lang="en-US" sz="2000" dirty="0">
-                <a:solidFill>
-                  <a:schemeClr val="accent6">
-                    <a:lumMod val="75000"/>
-                  </a:schemeClr>
-                </a:solidFill>
-                <a:latin typeface="Consolas" panose="020B0609020204030204" pitchFamily="49" charset="0"/>
-                <a:cs typeface="Segoe UI" panose="020B0502040204020203" pitchFamily="34" charset="0"/>
-              </a:rPr>
-              <a:t> </a:t>
-            </a:r>
-            <a:r>
-              <a:rPr lang="ru-RU" sz="2000" dirty="0">
-                <a:solidFill>
-                  <a:schemeClr val="accent6">
-                    <a:lumMod val="75000"/>
-                  </a:schemeClr>
-                </a:solidFill>
-                <a:latin typeface="Consolas" panose="020B0609020204030204" pitchFamily="49" charset="0"/>
-                <a:cs typeface="Segoe UI" panose="020B0502040204020203" pitchFamily="34" charset="0"/>
-              </a:rPr>
-              <a:t>я величина русской поэтической реальности</a:t>
+              <a:t>новая величина русской по эти чес кой реальности</a:t>
             </a:r>
             <a:endParaRPr lang="en-US" sz="2000" dirty="0">
               <a:solidFill>
@@ -6646,6 +6663,8 @@
               </a:rPr>
               <a:t>Двунаправленный алгоритм максимального соответствия</a:t>
             </a:r>
+          </a:p>
+          <a:p>
             <a:endParaRPr lang="en-US" sz="2000" dirty="0">
               <a:solidFill>
                 <a:srgbClr val="002060"/>
@@ -6669,6 +6688,8 @@
               </a:rPr>
               <a:t>Рекуррентная максимизация вероятности первого слова</a:t>
             </a:r>
+          </a:p>
+          <a:p>
             <a:endParaRPr lang="en-US" sz="2000" dirty="0">
               <a:solidFill>
                 <a:srgbClr val="002060"/>
@@ -6678,93 +6699,10 @@
             </a:endParaRPr>
           </a:p>
           <a:p>
-            <a:pPr lvl="1"/>
-            <a:r>
-              <a:rPr lang="en-US" sz="2000" dirty="0">
-                <a:solidFill>
-                  <a:schemeClr val="accent2">
-                    <a:lumMod val="75000"/>
-                  </a:schemeClr>
-                </a:solidFill>
-                <a:latin typeface="Consolas" panose="020B0609020204030204" pitchFamily="49" charset="0"/>
-                <a:cs typeface="Segoe UI" panose="020B0502040204020203" pitchFamily="34" charset="0"/>
-              </a:rPr>
-              <a:t>&gt;&gt; input: </a:t>
-            </a:r>
-            <a:r>
-              <a:rPr lang="ru-RU" sz="2000" dirty="0">
-                <a:solidFill>
-                  <a:schemeClr val="accent2">
-                    <a:lumMod val="75000"/>
-                  </a:schemeClr>
-                </a:solidFill>
-                <a:latin typeface="Consolas" panose="020B0609020204030204" pitchFamily="49" charset="0"/>
-                <a:cs typeface="Segoe UI" panose="020B0502040204020203" pitchFamily="34" charset="0"/>
-              </a:rPr>
-              <a:t>новаявеличинарусскойпоэтическойреальности</a:t>
-            </a:r>
-          </a:p>
-          <a:p>
-            <a:pPr lvl="1"/>
-            <a:r>
-              <a:rPr lang="en-US" sz="2000" dirty="0">
-                <a:solidFill>
-                  <a:schemeClr val="accent6">
-                    <a:lumMod val="75000"/>
-                  </a:schemeClr>
-                </a:solidFill>
-                <a:latin typeface="Consolas" panose="020B0609020204030204" pitchFamily="49" charset="0"/>
-                <a:cs typeface="Segoe UI" panose="020B0502040204020203" pitchFamily="34" charset="0"/>
-              </a:rPr>
-              <a:t>&gt;&gt; output: </a:t>
-            </a:r>
-            <a:r>
-              <a:rPr lang="ru-RU" sz="2000" dirty="0">
-                <a:solidFill>
-                  <a:schemeClr val="accent6">
-                    <a:lumMod val="75000"/>
-                  </a:schemeClr>
-                </a:solidFill>
-                <a:latin typeface="Consolas" panose="020B0609020204030204" pitchFamily="49" charset="0"/>
-                <a:cs typeface="Segoe UI" panose="020B0502040204020203" pitchFamily="34" charset="0"/>
-              </a:rPr>
-              <a:t>новая величина русской поэтической реальности</a:t>
-            </a:r>
-            <a:endParaRPr lang="en-US" sz="2000" dirty="0">
-              <a:solidFill>
-                <a:schemeClr val="accent6">
-                  <a:lumMod val="75000"/>
-                </a:schemeClr>
-              </a:solidFill>
-              <a:latin typeface="Consolas" panose="020B0609020204030204" pitchFamily="49" charset="0"/>
-              <a:cs typeface="Segoe UI" panose="020B0502040204020203" pitchFamily="34" charset="0"/>
-            </a:endParaRPr>
-          </a:p>
-          <a:p>
-            <a:pPr lvl="1"/>
-            <a:endParaRPr lang="en-US" sz="2000" dirty="0">
-              <a:solidFill>
-                <a:srgbClr val="002060"/>
-              </a:solidFill>
-              <a:latin typeface="Segoe UI" panose="020B0502040204020203" pitchFamily="34" charset="0"/>
-              <a:cs typeface="Segoe UI" panose="020B0502040204020203" pitchFamily="34" charset="0"/>
-            </a:endParaRPr>
-          </a:p>
-          <a:p>
             <a:pPr marL="342900" indent="-342900">
               <a:buFont typeface="Wingdings" panose="05000000000000000000" pitchFamily="2" charset="2"/>
               <a:buChar char="§"/>
             </a:pPr>
-            <a:r>
-              <a:rPr lang="en-US" sz="2000" dirty="0">
-                <a:solidFill>
-                  <a:srgbClr val="002060"/>
-                </a:solidFill>
-                <a:latin typeface="Segoe UI" panose="020B0502040204020203" pitchFamily="34" charset="0"/>
-                <a:cs typeface="Segoe UI" panose="020B0502040204020203" pitchFamily="34" charset="0"/>
-              </a:rPr>
-              <a:t>(</a:t>
-            </a:r>
             <a:r>
               <a:rPr lang="ru-RU" sz="2000" dirty="0">
                 <a:solidFill>
@@ -7026,8 +6964,8 @@
           </a:p>
         </p:txBody>
       </p:sp>
-      <mc:AlternateContent xmlns:mc="http://schemas.openxmlformats.org/markup-compatibility/2006">
-        <mc:Choice xmlns:a14="http://schemas.microsoft.com/office/drawing/2010/main" Requires="a14">
+      <mc:AlternateContent xmlns:mc="http://schemas.openxmlformats.org/markup-compatibility/2006" xmlns:a14="http://schemas.microsoft.com/office/drawing/2010/main">
+        <mc:Choice Requires="a14">
           <p:sp>
             <p:nvSpPr>
               <p:cNvPr id="10" name="TextBox 9">
@@ -7477,7 +7415,7 @@
             </p:txBody>
           </p:sp>
         </mc:Choice>
-        <mc:Fallback>
+        <mc:Fallback xmlns="">
           <p:sp>
             <p:nvSpPr>
               <p:cNvPr id="10" name="TextBox 9">
@@ -8311,7 +8249,7 @@
               <a:t>/</a:t>
             </a:r>
             <a:r>
-              <a:rPr lang="ru-RU" sz="1800" dirty="0">
+              <a:rPr lang="ru-RU" sz="1800" dirty="0" err="1">
                 <a:solidFill>
                   <a:schemeClr val="accent2">
                     <a:lumMod val="75000"/>
@@ -8320,7 +8258,19 @@
                 <a:latin typeface="Consolas" panose="020B0609020204030204" pitchFamily="49" charset="0"/>
                 <a:cs typeface="Segoe UI" panose="020B0502040204020203" pitchFamily="34" charset="0"/>
               </a:rPr>
-              <a:t>у 5 шт.</a:t>
+              <a:t>уп</a:t>
+            </a:r>
+            <a:r>
+              <a:rPr lang="ru-RU" sz="1800" dirty="0">
+                <a:solidFill>
+                  <a:schemeClr val="accent2">
+                    <a:lumMod val="75000"/>
+                  </a:schemeClr>
+                </a:solidFill>
+                <a:latin typeface="Consolas" panose="020B0609020204030204" pitchFamily="49" charset="0"/>
+                <a:cs typeface="Segoe UI" panose="020B0502040204020203" pitchFamily="34" charset="0"/>
+              </a:rPr>
+              <a:t> 5 шт.</a:t>
             </a:r>
             <a:endParaRPr lang="en-US" dirty="0">
               <a:solidFill>
@@ -8355,7 +8305,7 @@
                 <a:latin typeface="Consolas" panose="020B0609020204030204" pitchFamily="49" charset="0"/>
                 <a:cs typeface="Segoe UI" panose="020B0502040204020203" pitchFamily="34" charset="0"/>
               </a:rPr>
-              <a:t>салфетки бумажные вакуумная упаковка 5 штук </a:t>
+              <a:t>салфетки бумажные (вакуумная упаковка) 5 штук </a:t>
             </a:r>
           </a:p>
         </p:txBody>
@@ -8879,6 +8829,57 @@
           </a:prstGeom>
         </p:spPr>
       </p:pic>
+      <p:sp>
+        <p:nvSpPr>
+          <p:cNvPr id="9" name="TextBox 8">
+            <a:extLst>
+              <a:ext uri="{FF2B5EF4-FFF2-40B4-BE49-F238E27FC236}">
+                <a16:creationId xmlns:a16="http://schemas.microsoft.com/office/drawing/2014/main" id="{CE163E45-E5EF-4EE2-9CB3-CE0336D9DBAC}"/>
+              </a:ext>
+            </a:extLst>
+          </p:cNvPr>
+          <p:cNvSpPr txBox="1"/>
+          <p:nvPr/>
+        </p:nvSpPr>
+        <p:spPr>
+          <a:xfrm>
+            <a:off x="191938" y="6414541"/>
+            <a:ext cx="6094562" cy="369332"/>
+          </a:xfrm>
+          <a:prstGeom prst="rect">
+            <a:avLst/>
+          </a:prstGeom>
+          <a:noFill/>
+        </p:spPr>
+        <p:txBody>
+          <a:bodyPr wrap="square">
+            <a:spAutoFit/>
+          </a:bodyPr>
+          <a:lstStyle/>
+          <a:p>
+            <a:r>
+              <a:rPr lang="en-US" dirty="0">
+                <a:solidFill>
+                  <a:srgbClr val="002060"/>
+                </a:solidFill>
+                <a:hlinkClick r:id="rId3">
+                  <a:extLst>
+                    <a:ext uri="{A12FA001-AC4F-418D-AE19-62706E023703}">
+                      <ahyp:hlinkClr xmlns:ahyp="http://schemas.microsoft.com/office/drawing/2018/hyperlinkcolor" val="tx"/>
+                    </a:ext>
+                  </a:extLst>
+                </a:hlinkClick>
+              </a:rPr>
+              <a:t>Boosters</a:t>
+            </a:r>
+            <a:endParaRPr lang="ru-RU" dirty="0">
+              <a:solidFill>
+                <a:srgbClr val="002060"/>
+              </a:solidFill>
+            </a:endParaRPr>
+          </a:p>
+        </p:txBody>
+      </p:sp>
     </p:spTree>
     <p:extLst>
       <p:ext uri="{BB962C8B-B14F-4D97-AF65-F5344CB8AC3E}">
@@ -9685,7 +9686,7 @@
           <p:nvPr>
             <p:extLst>
               <p:ext uri="{D42A27DB-BD31-4B8C-83A1-F6EECF244321}">
-                <p14:modId xmlns:p14="http://schemas.microsoft.com/office/powerpoint/2010/main" val="2465928223"/>
+                <p14:modId xmlns:p14="http://schemas.microsoft.com/office/powerpoint/2010/main" val="1764386773"/>
               </p:ext>
             </p:extLst>
           </p:nvPr>
@@ -9736,7 +9737,20 @@
                     <a:bodyPr/>
                     <a:lstStyle/>
                     <a:p>
-                      <a:endParaRPr lang="ru-RU" sz="1400" dirty="0"/>
+                      <a:pPr algn="ctr"/>
+                      <a:r>
+                        <a:rPr lang="en-US" sz="2000" b="0" dirty="0">
+                          <a:solidFill>
+                            <a:srgbClr val="002060"/>
+                          </a:solidFill>
+                        </a:rPr>
+                        <a:t>F1 - SCORE</a:t>
+                      </a:r>
+                      <a:endParaRPr lang="ru-RU" sz="2000" b="0" dirty="0">
+                        <a:solidFill>
+                          <a:srgbClr val="002060"/>
+                        </a:solidFill>
+                      </a:endParaRPr>
                     </a:p>
                   </a:txBody>
                   <a:tcPr anchor="ctr"/>

</xml_diff>